<commit_message>
minor changes on NakovitzaPresentation.pptx
</commit_message>
<xml_diff>
--- a/NakovitzaPresentation.pptx
+++ b/NakovitzaPresentation.pptx
@@ -14,7 +14,6 @@
     <p:sldId id="262" r:id="rId8"/>
     <p:sldId id="263" r:id="rId9"/>
     <p:sldId id="269" r:id="rId10"/>
-    <p:sldId id="270" r:id="rId11"/>
   </p:sldIdLst>
   <p:sldSz cx="12192000" cy="6858000"/>
   <p:notesSz cx="6858000" cy="9144000"/>
@@ -113,6 +112,11 @@
       </a:defRPr>
     </a:lvl9pPr>
   </p:defaultTextStyle>
+  <p:extLst>
+    <p:ext uri="{EFAFB233-063F-42B5-8137-9DF3F51BA10A}">
+      <p15:sldGuideLst xmlns:p15="http://schemas.microsoft.com/office/powerpoint/2012/main"/>
+    </p:ext>
+  </p:extLst>
 </p:presentation>
 </file>
 
@@ -6251,7 +6255,7 @@
         </p:nvSpPr>
         <p:spPr>
           <a:xfrm>
-            <a:off x="1154954" y="1447800"/>
+            <a:off x="1013667" y="482788"/>
             <a:ext cx="9474946" cy="3329581"/>
           </a:xfrm>
         </p:spPr>
@@ -6450,7 +6454,7 @@
         </p:nvSpPr>
         <p:spPr>
           <a:xfrm>
-            <a:off x="1662955" y="3983631"/>
+            <a:off x="1662955" y="5229053"/>
             <a:ext cx="8825658" cy="1587500"/>
           </a:xfrm>
         </p:spPr>
@@ -6479,300 +6483,9 @@
           </a:p>
         </p:txBody>
       </p:sp>
-    </p:spTree>
-    <p:extLst>
-      <p:ext uri="{BB962C8B-B14F-4D97-AF65-F5344CB8AC3E}">
-        <p14:creationId xmlns:p14="http://schemas.microsoft.com/office/powerpoint/2010/main" val="614607038"/>
-      </p:ext>
-    </p:extLst>
-  </p:cSld>
-  <p:clrMapOvr>
-    <a:masterClrMapping/>
-  </p:clrMapOvr>
-  <mc:AlternateContent xmlns:mc="http://schemas.openxmlformats.org/markup-compatibility/2006">
-    <mc:Choice xmlns:p14="http://schemas.microsoft.com/office/powerpoint/2010/main" Requires="p14">
-      <p:transition p14:dur="100">
-        <p:cut/>
-      </p:transition>
-    </mc:Choice>
-    <mc:Fallback>
-      <p:transition>
-        <p:cut/>
-      </p:transition>
-    </mc:Fallback>
-  </mc:AlternateContent>
-  <p:timing>
-    <p:tnLst>
-      <p:par>
-        <p:cTn id="1" dur="indefinite" restart="never" nodeType="tmRoot"/>
-      </p:par>
-    </p:tnLst>
-  </p:timing>
-</p:sld>
-</file>
-
-<file path=ppt/slides/slide10.xml><?xml version="1.0" encoding="utf-8"?>
-<p:sld xmlns:a="http://schemas.openxmlformats.org/drawingml/2006/main" xmlns:r="http://schemas.openxmlformats.org/officeDocument/2006/relationships" xmlns:p="http://schemas.openxmlformats.org/presentationml/2006/main" showMasterSp="0">
-  <p:cSld>
-    <p:spTree>
-      <p:nvGrpSpPr>
-        <p:cNvPr id="1" name=""/>
-        <p:cNvGrpSpPr/>
-        <p:nvPr/>
-      </p:nvGrpSpPr>
-      <p:grpSpPr>
-        <a:xfrm>
-          <a:off x="0" y="0"/>
-          <a:ext cx="0" cy="0"/>
-          <a:chOff x="0" y="0"/>
-          <a:chExt cx="0" cy="0"/>
-        </a:xfrm>
-      </p:grpSpPr>
-      <p:sp>
-        <p:nvSpPr>
-          <p:cNvPr id="5" name="Title 1"/>
-          <p:cNvSpPr txBox="1">
-            <a:spLocks noGrp="1"/>
-          </p:cNvSpPr>
-          <p:nvPr>
-            <p:ph type="title"/>
-          </p:nvPr>
-        </p:nvSpPr>
-        <p:spPr>
-          <a:xfrm>
-            <a:off x="1433902" y="368311"/>
-            <a:ext cx="9404723" cy="1400530"/>
-          </a:xfrm>
-          <a:prstGeom prst="rect">
-            <a:avLst/>
-          </a:prstGeom>
-        </p:spPr>
-        <p:txBody>
-          <a:bodyPr vert="horz" lIns="91440" tIns="45720" rIns="91440" bIns="45720" rtlCol="0" anchor="t">
-            <a:noAutofit/>
-          </a:bodyPr>
-          <a:lstStyle>
-            <a:lvl1pPr algn="l" defTabSz="457200" rtl="0" eaLnBrk="1" latinLnBrk="0" hangingPunct="1">
-              <a:spcBef>
-                <a:spcPct val="0"/>
-              </a:spcBef>
-              <a:buNone/>
-              <a:defRPr sz="4200" b="0" i="0" kern="1200">
-                <a:solidFill>
-                  <a:schemeClr val="tx2"/>
-                </a:solidFill>
-                <a:latin typeface="+mj-lt"/>
-                <a:ea typeface="+mj-ea"/>
-                <a:cs typeface="+mj-cs"/>
-              </a:defRPr>
-            </a:lvl1pPr>
-            <a:lvl2pPr eaLnBrk="1" hangingPunct="1">
-              <a:defRPr>
-                <a:solidFill>
-                  <a:schemeClr val="tx2"/>
-                </a:solidFill>
-              </a:defRPr>
-            </a:lvl2pPr>
-            <a:lvl3pPr eaLnBrk="1" hangingPunct="1">
-              <a:defRPr>
-                <a:solidFill>
-                  <a:schemeClr val="tx2"/>
-                </a:solidFill>
-              </a:defRPr>
-            </a:lvl3pPr>
-            <a:lvl4pPr eaLnBrk="1" hangingPunct="1">
-              <a:defRPr>
-                <a:solidFill>
-                  <a:schemeClr val="tx2"/>
-                </a:solidFill>
-              </a:defRPr>
-            </a:lvl4pPr>
-            <a:lvl5pPr eaLnBrk="1" hangingPunct="1">
-              <a:defRPr>
-                <a:solidFill>
-                  <a:schemeClr val="tx2"/>
-                </a:solidFill>
-              </a:defRPr>
-            </a:lvl5pPr>
-            <a:lvl6pPr eaLnBrk="1" hangingPunct="1">
-              <a:defRPr>
-                <a:solidFill>
-                  <a:schemeClr val="tx2"/>
-                </a:solidFill>
-              </a:defRPr>
-            </a:lvl6pPr>
-            <a:lvl7pPr eaLnBrk="1" hangingPunct="1">
-              <a:defRPr>
-                <a:solidFill>
-                  <a:schemeClr val="tx2"/>
-                </a:solidFill>
-              </a:defRPr>
-            </a:lvl7pPr>
-            <a:lvl8pPr eaLnBrk="1" hangingPunct="1">
-              <a:defRPr>
-                <a:solidFill>
-                  <a:schemeClr val="tx2"/>
-                </a:solidFill>
-              </a:defRPr>
-            </a:lvl8pPr>
-            <a:lvl9pPr eaLnBrk="1" hangingPunct="1">
-              <a:defRPr>
-                <a:solidFill>
-                  <a:schemeClr val="tx2"/>
-                </a:solidFill>
-              </a:defRPr>
-            </a:lvl9pPr>
-          </a:lstStyle>
-          <a:p>
-            <a:pPr algn="ctr"/>
-            <a:r>
-              <a:rPr lang="en-US" sz="5500" i="1" dirty="0" smtClean="0">
-                <a:latin typeface="Agency FB" panose="020B0503020202020204" pitchFamily="34" charset="0"/>
-              </a:rPr>
-              <a:t>Team COCONUT </a:t>
-            </a:r>
-            <a:br>
-              <a:rPr lang="en-US" sz="5500" i="1" dirty="0" smtClean="0">
-                <a:latin typeface="Agency FB" panose="020B0503020202020204" pitchFamily="34" charset="0"/>
-              </a:rPr>
-            </a:br>
-            <a:r>
-              <a:rPr lang="en-US" sz="5500" i="1" dirty="0" smtClean="0">
-                <a:latin typeface="Agency FB" panose="020B0503020202020204" pitchFamily="34" charset="0"/>
-              </a:rPr>
-              <a:t>Members:</a:t>
-            </a:r>
-            <a:endParaRPr lang="en-US" sz="5500" i="1" dirty="0">
-              <a:latin typeface="Agency FB" panose="020B0503020202020204" pitchFamily="34" charset="0"/>
-            </a:endParaRPr>
-          </a:p>
-        </p:txBody>
-      </p:sp>
-      <p:sp>
-        <p:nvSpPr>
-          <p:cNvPr id="6" name="Content Placeholder 2"/>
-          <p:cNvSpPr>
-            <a:spLocks noGrp="1"/>
-          </p:cNvSpPr>
-          <p:nvPr>
-            <p:ph sz="half" idx="1"/>
-          </p:nvPr>
-        </p:nvSpPr>
-        <p:spPr>
-          <a:xfrm>
-            <a:off x="1117379" y="5430127"/>
-            <a:ext cx="4396339" cy="826209"/>
-          </a:xfrm>
-        </p:spPr>
-        <p:txBody>
-          <a:bodyPr>
-            <a:normAutofit/>
-          </a:bodyPr>
-          <a:lstStyle/>
-          <a:p>
-            <a:pPr marL="0" indent="0" algn="ctr">
-              <a:buNone/>
-            </a:pPr>
-            <a:r>
-              <a:rPr lang="en-US" sz="3000" dirty="0" smtClean="0">
-                <a:latin typeface="Agency FB" panose="020B0503020202020204" pitchFamily="34" charset="0"/>
-              </a:rPr>
-              <a:t>Martin </a:t>
-            </a:r>
-            <a:r>
-              <a:rPr lang="en-US" sz="3000" dirty="0" err="1" smtClean="0">
-                <a:latin typeface="Agency FB" panose="020B0503020202020204" pitchFamily="34" charset="0"/>
-              </a:rPr>
-              <a:t>Kurshumov</a:t>
-            </a:r>
-            <a:endParaRPr lang="en-US" sz="3000" dirty="0">
-              <a:latin typeface="Agency FB" panose="020B0503020202020204" pitchFamily="34" charset="0"/>
-            </a:endParaRPr>
-          </a:p>
-        </p:txBody>
-      </p:sp>
-      <p:sp>
-        <p:nvSpPr>
-          <p:cNvPr id="7" name="Content Placeholder 2"/>
-          <p:cNvSpPr>
-            <a:spLocks noGrp="1"/>
-          </p:cNvSpPr>
-          <p:nvPr>
-            <p:ph sz="half" idx="1"/>
-          </p:nvPr>
-        </p:nvSpPr>
-        <p:spPr>
-          <a:xfrm>
-            <a:off x="6442286" y="5430128"/>
-            <a:ext cx="4396339" cy="826209"/>
-          </a:xfrm>
-        </p:spPr>
-        <p:txBody>
-          <a:bodyPr>
-            <a:normAutofit/>
-          </a:bodyPr>
-          <a:lstStyle/>
-          <a:p>
-            <a:pPr marL="0" indent="0" algn="ctr">
-              <a:buNone/>
-            </a:pPr>
-            <a:r>
-              <a:rPr lang="en-US" sz="3000" dirty="0" err="1" smtClean="0">
-                <a:latin typeface="Agency FB" panose="020B0503020202020204" pitchFamily="34" charset="0"/>
-              </a:rPr>
-              <a:t>Kaloyan</a:t>
-            </a:r>
-            <a:r>
-              <a:rPr lang="en-US" sz="3000" dirty="0" smtClean="0">
-                <a:latin typeface="Agency FB" panose="020B0503020202020204" pitchFamily="34" charset="0"/>
-              </a:rPr>
-              <a:t> </a:t>
-            </a:r>
-            <a:r>
-              <a:rPr lang="en-US" sz="3000" dirty="0" err="1" smtClean="0">
-                <a:latin typeface="Agency FB" panose="020B0503020202020204" pitchFamily="34" charset="0"/>
-              </a:rPr>
-              <a:t>Botev</a:t>
-            </a:r>
-            <a:endParaRPr lang="en-US" sz="3000" dirty="0">
-              <a:latin typeface="Agency FB" panose="020B0503020202020204" pitchFamily="34" charset="0"/>
-            </a:endParaRPr>
-          </a:p>
-        </p:txBody>
-      </p:sp>
       <p:pic>
         <p:nvPicPr>
-          <p:cNvPr id="8" name="Picture 7"/>
-          <p:cNvPicPr>
-            <a:picLocks noChangeAspect="1"/>
-          </p:cNvPicPr>
-          <p:nvPr/>
-        </p:nvPicPr>
-        <p:blipFill>
-          <a:blip r:embed="rId2">
-            <a:extLst>
-              <a:ext uri="{28A0092B-C50C-407E-A947-70E740481C1C}">
-                <a14:useLocalDpi xmlns:a14="http://schemas.microsoft.com/office/drawing/2010/main" val="0"/>
-              </a:ext>
-            </a:extLst>
-          </a:blip>
-          <a:stretch>
-            <a:fillRect/>
-          </a:stretch>
-        </p:blipFill>
-        <p:spPr>
-          <a:xfrm>
-            <a:off x="1723033" y="2479197"/>
-            <a:ext cx="3185029" cy="2782120"/>
-          </a:xfrm>
-          <a:prstGeom prst="rect">
-            <a:avLst/>
-          </a:prstGeom>
-        </p:spPr>
-      </p:pic>
-      <p:pic>
-        <p:nvPicPr>
-          <p:cNvPr id="9" name="Picture 8"/>
+          <p:cNvPr id="4" name="Picture 3"/>
           <p:cNvPicPr>
             <a:picLocks noChangeAspect="1"/>
           </p:cNvPicPr>
@@ -6792,8 +6505,8 @@
         </p:blipFill>
         <p:spPr>
           <a:xfrm>
-            <a:off x="7101769" y="2479196"/>
-            <a:ext cx="3077372" cy="2782121"/>
+            <a:off x="3632906" y="1638709"/>
+            <a:ext cx="4885756" cy="3253914"/>
           </a:xfrm>
           <a:prstGeom prst="rect">
             <a:avLst/>
@@ -6803,13 +6516,25 @@
     </p:spTree>
     <p:extLst>
       <p:ext uri="{BB962C8B-B14F-4D97-AF65-F5344CB8AC3E}">
-        <p14:creationId xmlns:p14="http://schemas.microsoft.com/office/powerpoint/2010/main" val="2011343709"/>
+        <p14:creationId xmlns:p14="http://schemas.microsoft.com/office/powerpoint/2010/main" val="614607038"/>
       </p:ext>
     </p:extLst>
   </p:cSld>
   <p:clrMapOvr>
     <a:masterClrMapping/>
   </p:clrMapOvr>
+  <mc:AlternateContent xmlns:mc="http://schemas.openxmlformats.org/markup-compatibility/2006" xmlns:p14="http://schemas.microsoft.com/office/powerpoint/2010/main">
+    <mc:Choice Requires="p14">
+      <p:transition p14:dur="100">
+        <p:cut/>
+      </p:transition>
+    </mc:Choice>
+    <mc:Fallback xmlns="">
+      <p:transition>
+        <p:cut/>
+      </p:transition>
+    </mc:Fallback>
+  </mc:AlternateContent>
   <p:timing>
     <p:tnLst>
       <p:par>
@@ -7217,6 +6942,23 @@
             <a:off x="2138289" y="1965789"/>
             <a:ext cx="8117057" cy="3970777"/>
           </a:xfrm>
+          <a:prstGeom prst="rect">
+            <a:avLst/>
+          </a:prstGeom>
+          <a:ln w="38100" cap="sq">
+            <a:solidFill>
+              <a:srgbClr val="000000"/>
+            </a:solidFill>
+            <a:prstDash val="solid"/>
+            <a:miter lim="800000"/>
+          </a:ln>
+          <a:effectLst>
+            <a:outerShdw blurRad="50800" dist="38100" dir="2700000" algn="tl" rotWithShape="0">
+              <a:srgbClr val="000000">
+                <a:alpha val="43000"/>
+              </a:srgbClr>
+            </a:outerShdw>
+          </a:effectLst>
         </p:spPr>
       </p:pic>
     </p:spTree>
@@ -7401,13 +7143,13 @@
         </p:nvSpPr>
         <p:spPr>
           <a:xfrm>
-            <a:off x="1294228" y="745587"/>
-            <a:ext cx="9357508" cy="5573149"/>
+            <a:off x="966159" y="707365"/>
+            <a:ext cx="10351698" cy="5611371"/>
           </a:xfrm>
         </p:spPr>
         <p:txBody>
           <a:bodyPr>
-            <a:normAutofit/>
+            <a:normAutofit fontScale="92500" lnSpcReduction="10000"/>
           </a:bodyPr>
           <a:lstStyle/>
           <a:p>
@@ -7416,8 +7158,13 @@
             </a:pPr>
             <a:r>
               <a:rPr lang="bg-BG" sz="4000" dirty="0" smtClean="0"/>
-              <a:t>Колкото повече „бири“  (				)</a:t>
-            </a:r>
+              <a:t>Колкото повече „бири“  (			</a:t>
+            </a:r>
+            <a:r>
+              <a:rPr lang="bg-BG" sz="4000" dirty="0" smtClean="0"/>
+              <a:t> )</a:t>
+            </a:r>
+            <a:endParaRPr lang="bg-BG" sz="4000" dirty="0" smtClean="0"/>
           </a:p>
           <a:p>
             <a:pPr marL="0" indent="0">
@@ -7429,8 +7176,23 @@
             </a:r>
             <a:r>
               <a:rPr lang="bg-BG" sz="4000" dirty="0"/>
-              <a:t>по-бавен и труден за управление става Наков.</a:t>
-            </a:r>
+              <a:t>по-бавен и труден за управление става Наков</a:t>
+            </a:r>
+            <a:r>
+              <a:rPr lang="bg-BG" sz="4000" dirty="0" smtClean="0"/>
+              <a:t>.</a:t>
+            </a:r>
+            <a:endParaRPr lang="en-US" sz="4000" dirty="0" smtClean="0"/>
+          </a:p>
+          <a:p>
+            <a:pPr marL="0" indent="0">
+              <a:buNone/>
+            </a:pPr>
+            <a:r>
+              <a:rPr lang="bg-BG" sz="4000" dirty="0" smtClean="0"/>
+              <a:t>След изпити 30 бири, контролите наляво и надясно се разменят.</a:t>
+            </a:r>
+            <a:endParaRPr lang="bg-BG" sz="4000" dirty="0"/>
           </a:p>
           <a:p>
             <a:pPr marL="0" indent="0">
@@ -7444,7 +7206,15 @@
             </a:pPr>
             <a:r>
               <a:rPr lang="bg-BG" sz="3800" dirty="0" smtClean="0"/>
-              <a:t>Бонус бутилките „ ракия“ (		 ) излизат през определен период  и носят допълнително време, както и правят героя ви по-бърз.			</a:t>
+              <a:t>Бонус бутилките „ ракия“ (		 </a:t>
+            </a:r>
+            <a:r>
+              <a:rPr lang="bg-BG" sz="3800" dirty="0" smtClean="0"/>
+              <a:t> ) </a:t>
+            </a:r>
+            <a:r>
+              <a:rPr lang="bg-BG" sz="3800" dirty="0" smtClean="0"/>
+              <a:t>излизат през определен период  и носят допълнително време, както и правят героя ви по-бърз.			</a:t>
             </a:r>
             <a:r>
               <a:rPr lang="bg-BG" sz="4000" dirty="0" smtClean="0"/>
@@ -7467,7 +7237,7 @@
       </p:sp>
       <p:pic>
         <p:nvPicPr>
-          <p:cNvPr id="4" name="Picture 3"/>
+          <p:cNvPr id="5" name="Picture 4"/>
           <p:cNvPicPr>
             <a:picLocks noChangeAspect="1"/>
           </p:cNvPicPr>
@@ -7487,8 +7257,8 @@
         </p:blipFill>
         <p:spPr>
           <a:xfrm>
-            <a:off x="7976065" y="422031"/>
-            <a:ext cx="1111662" cy="1111662"/>
+            <a:off x="6998070" y="3362581"/>
+            <a:ext cx="710576" cy="1443344"/>
           </a:xfrm>
           <a:prstGeom prst="rect">
             <a:avLst/>
@@ -7497,7 +7267,7 @@
       </p:pic>
       <p:pic>
         <p:nvPicPr>
-          <p:cNvPr id="5" name="Picture 4"/>
+          <p:cNvPr id="2" name="Picture 1"/>
           <p:cNvPicPr>
             <a:picLocks noChangeAspect="1"/>
           </p:cNvPicPr>
@@ -7517,8 +7287,8 @@
         </p:blipFill>
         <p:spPr>
           <a:xfrm>
-            <a:off x="7976065" y="2810489"/>
-            <a:ext cx="710576" cy="1443344"/>
+            <a:off x="6998070" y="156364"/>
+            <a:ext cx="1102001" cy="1102001"/>
           </a:xfrm>
           <a:prstGeom prst="rect">
             <a:avLst/>
@@ -7590,17 +7360,30 @@
               <a:t>		</a:t>
             </a:r>
             <a:r>
-              <a:rPr lang="en-US" dirty="0" smtClean="0"/>
-              <a:t>“</a:t>
+              <a:rPr lang="en-US" sz="4000" dirty="0"/>
+              <a:t> </a:t>
             </a:r>
             <a:r>
               <a:rPr lang="en-US" sz="4000" dirty="0" smtClean="0"/>
-              <a:t>Drunk-O-Meter ” (					</a:t>
+              <a:t>”Drunk-O-Meter </a:t>
+            </a:r>
+            <a:r>
+              <a:rPr lang="en-US" sz="4000" dirty="0" smtClean="0"/>
+              <a:t>” (			</a:t>
+            </a:r>
+            <a:r>
+              <a:rPr lang="en-US" sz="4000" dirty="0"/>
+              <a:t> </a:t>
+            </a:r>
+            <a:r>
+              <a:rPr lang="en-US" sz="4000" dirty="0" smtClean="0"/>
+              <a:t>  </a:t>
             </a:r>
             <a:r>
               <a:rPr lang="bg-BG" sz="4000" dirty="0" smtClean="0"/>
               <a:t>) </a:t>
             </a:r>
+            <a:endParaRPr lang="bg-BG" sz="4000" dirty="0" smtClean="0"/>
           </a:p>
           <a:p>
             <a:pPr marL="0" indent="0">
@@ -7644,7 +7427,7 @@
         </p:blipFill>
         <p:spPr>
           <a:xfrm>
-            <a:off x="7233234" y="986070"/>
+            <a:off x="7336751" y="986070"/>
             <a:ext cx="1523809" cy="1003175"/>
           </a:xfrm>
           <a:prstGeom prst="rect">
@@ -7701,7 +7484,7 @@
         </p:nvSpPr>
         <p:spPr>
           <a:xfrm>
-            <a:off x="1297595" y="5387927"/>
+            <a:off x="-685424" y="5203525"/>
             <a:ext cx="4467494" cy="784005"/>
           </a:xfrm>
         </p:spPr>
@@ -7738,7 +7521,7 @@
         </p:nvSpPr>
         <p:spPr>
           <a:xfrm>
-            <a:off x="6259404" y="5387927"/>
+            <a:off x="2445155" y="5162955"/>
             <a:ext cx="4396341" cy="784005"/>
           </a:xfrm>
         </p:spPr>
@@ -7915,12 +7698,26 @@
         </p:blipFill>
         <p:spPr>
           <a:xfrm>
-            <a:off x="1984247" y="2574388"/>
-            <a:ext cx="3094190" cy="2706418"/>
+            <a:off x="116422" y="2551588"/>
+            <a:ext cx="2863802" cy="2504903"/>
           </a:xfrm>
           <a:prstGeom prst="rect">
             <a:avLst/>
           </a:prstGeom>
+          <a:ln w="38100" cap="sq">
+            <a:solidFill>
+              <a:srgbClr val="000000"/>
+            </a:solidFill>
+            <a:prstDash val="solid"/>
+            <a:miter lim="800000"/>
+          </a:ln>
+          <a:effectLst>
+            <a:outerShdw blurRad="50800" dist="38100" dir="2700000" algn="tl" rotWithShape="0">
+              <a:srgbClr val="000000">
+                <a:alpha val="43000"/>
+              </a:srgbClr>
+            </a:outerShdw>
+          </a:effectLst>
         </p:spPr>
       </p:pic>
       <p:pic>
@@ -7945,14 +7742,658 @@
         </p:blipFill>
         <p:spPr>
           <a:xfrm>
-            <a:off x="7005711" y="2574388"/>
-            <a:ext cx="3136657" cy="2706418"/>
+            <a:off x="3191773" y="2554898"/>
+            <a:ext cx="2903107" cy="2504903"/>
+          </a:xfrm>
+          <a:prstGeom prst="rect">
+            <a:avLst/>
+          </a:prstGeom>
+          <a:ln w="38100" cap="sq">
+            <a:solidFill>
+              <a:srgbClr val="000000"/>
+            </a:solidFill>
+            <a:prstDash val="solid"/>
+            <a:miter lim="800000"/>
+          </a:ln>
+          <a:effectLst>
+            <a:outerShdw blurRad="50800" dist="38100" dir="2700000" algn="tl" rotWithShape="0">
+              <a:srgbClr val="000000">
+                <a:alpha val="43000"/>
+              </a:srgbClr>
+            </a:outerShdw>
+          </a:effectLst>
+        </p:spPr>
+      </p:pic>
+      <p:pic>
+        <p:nvPicPr>
+          <p:cNvPr id="7" name="Picture 6"/>
+          <p:cNvPicPr>
+            <a:picLocks noChangeAspect="1"/>
+          </p:cNvPicPr>
+          <p:nvPr/>
+        </p:nvPicPr>
+        <p:blipFill>
+          <a:blip r:embed="rId4">
+            <a:extLst>
+              <a:ext uri="{28A0092B-C50C-407E-A947-70E740481C1C}">
+                <a14:useLocalDpi xmlns:a14="http://schemas.microsoft.com/office/drawing/2010/main" val="0"/>
+              </a:ext>
+            </a:extLst>
+          </a:blip>
+          <a:stretch>
+            <a:fillRect/>
+          </a:stretch>
+        </p:blipFill>
+        <p:spPr>
+          <a:xfrm>
+            <a:off x="6306427" y="2561322"/>
+            <a:ext cx="2845377" cy="2485434"/>
+          </a:xfrm>
+          <a:prstGeom prst="rect">
+            <a:avLst/>
+          </a:prstGeom>
+          <a:ln w="38100" cap="sq">
+            <a:solidFill>
+              <a:srgbClr val="000000"/>
+            </a:solidFill>
+            <a:prstDash val="solid"/>
+            <a:miter lim="800000"/>
+          </a:ln>
+          <a:effectLst>
+            <a:outerShdw blurRad="50800" dist="38100" dir="2700000" algn="tl" rotWithShape="0">
+              <a:srgbClr val="000000">
+                <a:alpha val="43000"/>
+              </a:srgbClr>
+            </a:outerShdw>
+          </a:effectLst>
+        </p:spPr>
+      </p:pic>
+      <p:pic>
+        <p:nvPicPr>
+          <p:cNvPr id="10" name="Picture 9"/>
+          <p:cNvPicPr>
+            <a:picLocks noChangeAspect="1"/>
+          </p:cNvPicPr>
+          <p:nvPr/>
+        </p:nvPicPr>
+        <p:blipFill>
+          <a:blip r:embed="rId5">
+            <a:extLst>
+              <a:ext uri="{28A0092B-C50C-407E-A947-70E740481C1C}">
+                <a14:useLocalDpi xmlns:a14="http://schemas.microsoft.com/office/drawing/2010/main" val="0"/>
+              </a:ext>
+            </a:extLst>
+          </a:blip>
+          <a:stretch>
+            <a:fillRect/>
+          </a:stretch>
+        </p:blipFill>
+        <p:spPr>
+          <a:xfrm>
+            <a:off x="9363355" y="2574367"/>
+            <a:ext cx="2705000" cy="2504903"/>
+          </a:xfrm>
+          <a:prstGeom prst="rect">
+            <a:avLst/>
+          </a:prstGeom>
+          <a:ln w="38100" cap="sq">
+            <a:solidFill>
+              <a:srgbClr val="000000"/>
+            </a:solidFill>
+            <a:prstDash val="solid"/>
+            <a:miter lim="800000"/>
+          </a:ln>
+          <a:effectLst>
+            <a:outerShdw blurRad="50800" dist="38100" dir="2700000" algn="tl" rotWithShape="0">
+              <a:srgbClr val="000000">
+                <a:alpha val="43000"/>
+              </a:srgbClr>
+            </a:outerShdw>
+          </a:effectLst>
+        </p:spPr>
+      </p:pic>
+      <p:sp>
+        <p:nvSpPr>
+          <p:cNvPr id="11" name="Content Placeholder 2"/>
+          <p:cNvSpPr txBox="1">
+            <a:spLocks/>
+          </p:cNvSpPr>
+          <p:nvPr/>
+        </p:nvSpPr>
+        <p:spPr>
+          <a:xfrm>
+            <a:off x="5575736" y="5165861"/>
+            <a:ext cx="4396339" cy="826209"/>
           </a:xfrm>
           <a:prstGeom prst="rect">
             <a:avLst/>
           </a:prstGeom>
         </p:spPr>
-      </p:pic>
+        <p:txBody>
+          <a:bodyPr vert="horz" lIns="91440" tIns="45720" rIns="91440" bIns="45720" rtlCol="0">
+            <a:normAutofit/>
+          </a:bodyPr>
+          <a:lstStyle>
+            <a:lvl1pPr marL="342900" indent="-342900" algn="l" defTabSz="457200" rtl="0" eaLnBrk="1" latinLnBrk="0" hangingPunct="1">
+              <a:spcBef>
+                <a:spcPts val="1000"/>
+              </a:spcBef>
+              <a:spcAft>
+                <a:spcPts val="0"/>
+              </a:spcAft>
+              <a:buClr>
+                <a:schemeClr val="bg2">
+                  <a:lumMod val="40000"/>
+                  <a:lumOff val="60000"/>
+                </a:schemeClr>
+              </a:buClr>
+              <a:buSzPct val="80000"/>
+              <a:buFont typeface="Wingdings 3" charset="2"/>
+              <a:buChar char=""/>
+              <a:defRPr sz="1800" b="0" i="0" kern="1200">
+                <a:solidFill>
+                  <a:schemeClr val="tx1"/>
+                </a:solidFill>
+                <a:latin typeface="+mj-lt"/>
+                <a:ea typeface="+mj-ea"/>
+                <a:cs typeface="+mj-cs"/>
+              </a:defRPr>
+            </a:lvl1pPr>
+            <a:lvl2pPr marL="742950" indent="-285750" algn="l" defTabSz="457200" rtl="0" eaLnBrk="1" latinLnBrk="0" hangingPunct="1">
+              <a:spcBef>
+                <a:spcPts val="1000"/>
+              </a:spcBef>
+              <a:spcAft>
+                <a:spcPts val="0"/>
+              </a:spcAft>
+              <a:buClr>
+                <a:schemeClr val="bg2">
+                  <a:lumMod val="40000"/>
+                  <a:lumOff val="60000"/>
+                </a:schemeClr>
+              </a:buClr>
+              <a:buSzPct val="80000"/>
+              <a:buFont typeface="Wingdings 3" charset="2"/>
+              <a:buChar char=""/>
+              <a:defRPr sz="1600" b="0" i="0" kern="1200">
+                <a:solidFill>
+                  <a:schemeClr val="tx1"/>
+                </a:solidFill>
+                <a:latin typeface="+mj-lt"/>
+                <a:ea typeface="+mj-ea"/>
+                <a:cs typeface="+mj-cs"/>
+              </a:defRPr>
+            </a:lvl2pPr>
+            <a:lvl3pPr marL="1143000" indent="-228600" algn="l" defTabSz="457200" rtl="0" eaLnBrk="1" latinLnBrk="0" hangingPunct="1">
+              <a:spcBef>
+                <a:spcPts val="1000"/>
+              </a:spcBef>
+              <a:spcAft>
+                <a:spcPts val="0"/>
+              </a:spcAft>
+              <a:buClr>
+                <a:schemeClr val="bg2">
+                  <a:lumMod val="40000"/>
+                  <a:lumOff val="60000"/>
+                </a:schemeClr>
+              </a:buClr>
+              <a:buSzPct val="80000"/>
+              <a:buFont typeface="Wingdings 3" charset="2"/>
+              <a:buChar char=""/>
+              <a:defRPr sz="1400" b="0" i="0" kern="1200">
+                <a:solidFill>
+                  <a:schemeClr val="tx1"/>
+                </a:solidFill>
+                <a:latin typeface="+mj-lt"/>
+                <a:ea typeface="+mj-ea"/>
+                <a:cs typeface="+mj-cs"/>
+              </a:defRPr>
+            </a:lvl3pPr>
+            <a:lvl4pPr marL="1600200" indent="-228600" algn="l" defTabSz="457200" rtl="0" eaLnBrk="1" latinLnBrk="0" hangingPunct="1">
+              <a:spcBef>
+                <a:spcPts val="1000"/>
+              </a:spcBef>
+              <a:spcAft>
+                <a:spcPts val="0"/>
+              </a:spcAft>
+              <a:buClr>
+                <a:schemeClr val="bg2">
+                  <a:lumMod val="40000"/>
+                  <a:lumOff val="60000"/>
+                </a:schemeClr>
+              </a:buClr>
+              <a:buSzPct val="80000"/>
+              <a:buFont typeface="Wingdings 3" charset="2"/>
+              <a:buChar char=""/>
+              <a:defRPr sz="1200" b="0" i="0" kern="1200">
+                <a:solidFill>
+                  <a:schemeClr val="tx1"/>
+                </a:solidFill>
+                <a:latin typeface="+mj-lt"/>
+                <a:ea typeface="+mj-ea"/>
+                <a:cs typeface="+mj-cs"/>
+              </a:defRPr>
+            </a:lvl4pPr>
+            <a:lvl5pPr marL="2057400" indent="-228600" algn="l" defTabSz="457200" rtl="0" eaLnBrk="1" latinLnBrk="0" hangingPunct="1">
+              <a:spcBef>
+                <a:spcPts val="1000"/>
+              </a:spcBef>
+              <a:spcAft>
+                <a:spcPts val="0"/>
+              </a:spcAft>
+              <a:buClr>
+                <a:schemeClr val="bg2">
+                  <a:lumMod val="40000"/>
+                  <a:lumOff val="60000"/>
+                </a:schemeClr>
+              </a:buClr>
+              <a:buSzPct val="80000"/>
+              <a:buFont typeface="Wingdings 3" charset="2"/>
+              <a:buChar char=""/>
+              <a:defRPr sz="1200" b="0" i="0" kern="1200">
+                <a:solidFill>
+                  <a:schemeClr val="tx1"/>
+                </a:solidFill>
+                <a:latin typeface="+mj-lt"/>
+                <a:ea typeface="+mj-ea"/>
+                <a:cs typeface="+mj-cs"/>
+              </a:defRPr>
+            </a:lvl5pPr>
+            <a:lvl6pPr marL="2506000" indent="-228600" algn="l" defTabSz="457200" rtl="0" eaLnBrk="1" latinLnBrk="0" hangingPunct="1">
+              <a:spcBef>
+                <a:spcPts val="1000"/>
+              </a:spcBef>
+              <a:spcAft>
+                <a:spcPts val="0"/>
+              </a:spcAft>
+              <a:buClr>
+                <a:schemeClr val="bg2">
+                  <a:lumMod val="40000"/>
+                  <a:lumOff val="60000"/>
+                </a:schemeClr>
+              </a:buClr>
+              <a:buSzPct val="80000"/>
+              <a:buFont typeface="Wingdings 3" charset="2"/>
+              <a:buChar char=""/>
+              <a:defRPr sz="1200" b="0" i="0" kern="1200">
+                <a:solidFill>
+                  <a:schemeClr val="tx1"/>
+                </a:solidFill>
+                <a:latin typeface="+mj-lt"/>
+                <a:ea typeface="+mj-ea"/>
+                <a:cs typeface="+mj-cs"/>
+              </a:defRPr>
+            </a:lvl6pPr>
+            <a:lvl7pPr marL="2971800" indent="-228600" algn="l" defTabSz="457200" rtl="0" eaLnBrk="1" latinLnBrk="0" hangingPunct="1">
+              <a:spcBef>
+                <a:spcPts val="1000"/>
+              </a:spcBef>
+              <a:spcAft>
+                <a:spcPts val="0"/>
+              </a:spcAft>
+              <a:buClr>
+                <a:schemeClr val="bg2">
+                  <a:lumMod val="40000"/>
+                  <a:lumOff val="60000"/>
+                </a:schemeClr>
+              </a:buClr>
+              <a:buSzPct val="80000"/>
+              <a:buFont typeface="Wingdings 3" charset="2"/>
+              <a:buChar char=""/>
+              <a:defRPr sz="1200" b="0" i="0" kern="1200">
+                <a:solidFill>
+                  <a:schemeClr val="tx1"/>
+                </a:solidFill>
+                <a:latin typeface="+mj-lt"/>
+                <a:ea typeface="+mj-ea"/>
+                <a:cs typeface="+mj-cs"/>
+              </a:defRPr>
+            </a:lvl7pPr>
+            <a:lvl8pPr marL="3429000" indent="-228600" algn="l" defTabSz="457200" rtl="0" eaLnBrk="1" latinLnBrk="0" hangingPunct="1">
+              <a:spcBef>
+                <a:spcPts val="1000"/>
+              </a:spcBef>
+              <a:spcAft>
+                <a:spcPts val="0"/>
+              </a:spcAft>
+              <a:buClr>
+                <a:schemeClr val="bg2">
+                  <a:lumMod val="40000"/>
+                  <a:lumOff val="60000"/>
+                </a:schemeClr>
+              </a:buClr>
+              <a:buSzPct val="80000"/>
+              <a:buFont typeface="Wingdings 3" charset="2"/>
+              <a:buChar char=""/>
+              <a:defRPr sz="1200" b="0" i="0" kern="1200">
+                <a:solidFill>
+                  <a:schemeClr val="tx1"/>
+                </a:solidFill>
+                <a:latin typeface="+mj-lt"/>
+                <a:ea typeface="+mj-ea"/>
+                <a:cs typeface="+mj-cs"/>
+              </a:defRPr>
+            </a:lvl8pPr>
+            <a:lvl9pPr marL="3886200" indent="-228600" algn="l" defTabSz="457200" rtl="0" eaLnBrk="1" latinLnBrk="0" hangingPunct="1">
+              <a:spcBef>
+                <a:spcPts val="1000"/>
+              </a:spcBef>
+              <a:spcAft>
+                <a:spcPts val="0"/>
+              </a:spcAft>
+              <a:buClr>
+                <a:schemeClr val="bg2">
+                  <a:lumMod val="40000"/>
+                  <a:lumOff val="60000"/>
+                </a:schemeClr>
+              </a:buClr>
+              <a:buSzPct val="80000"/>
+              <a:buFont typeface="Wingdings 3" charset="2"/>
+              <a:buChar char=""/>
+              <a:defRPr sz="1200" b="0" i="0" kern="1200">
+                <a:solidFill>
+                  <a:schemeClr val="tx1"/>
+                </a:solidFill>
+                <a:latin typeface="+mj-lt"/>
+                <a:ea typeface="+mj-ea"/>
+                <a:cs typeface="+mj-cs"/>
+              </a:defRPr>
+            </a:lvl9pPr>
+          </a:lstStyle>
+          <a:p>
+            <a:pPr marL="0" indent="0" algn="ctr">
+              <a:buFont typeface="Wingdings 3" charset="2"/>
+              <a:buNone/>
+            </a:pPr>
+            <a:r>
+              <a:rPr lang="en-US" sz="3000" dirty="0" smtClean="0">
+                <a:latin typeface="Agency FB" panose="020B0503020202020204" pitchFamily="34" charset="0"/>
+              </a:rPr>
+              <a:t>Martin Kurshumov</a:t>
+            </a:r>
+            <a:endParaRPr lang="en-US" sz="3000" dirty="0">
+              <a:latin typeface="Agency FB" panose="020B0503020202020204" pitchFamily="34" charset="0"/>
+            </a:endParaRPr>
+          </a:p>
+        </p:txBody>
+      </p:sp>
+      <p:sp>
+        <p:nvSpPr>
+          <p:cNvPr id="12" name="Content Placeholder 2"/>
+          <p:cNvSpPr txBox="1">
+            <a:spLocks/>
+          </p:cNvSpPr>
+          <p:nvPr/>
+        </p:nvSpPr>
+        <p:spPr>
+          <a:xfrm>
+            <a:off x="8517685" y="5161321"/>
+            <a:ext cx="4396339" cy="826209"/>
+          </a:xfrm>
+          <a:prstGeom prst="rect">
+            <a:avLst/>
+          </a:prstGeom>
+        </p:spPr>
+        <p:txBody>
+          <a:bodyPr vert="horz" lIns="91440" tIns="45720" rIns="91440" bIns="45720" rtlCol="0">
+            <a:normAutofit/>
+          </a:bodyPr>
+          <a:lstStyle>
+            <a:lvl1pPr marL="342900" indent="-342900" algn="l" defTabSz="457200" rtl="0" eaLnBrk="1" latinLnBrk="0" hangingPunct="1">
+              <a:spcBef>
+                <a:spcPts val="1000"/>
+              </a:spcBef>
+              <a:spcAft>
+                <a:spcPts val="0"/>
+              </a:spcAft>
+              <a:buClr>
+                <a:schemeClr val="bg2">
+                  <a:lumMod val="40000"/>
+                  <a:lumOff val="60000"/>
+                </a:schemeClr>
+              </a:buClr>
+              <a:buSzPct val="80000"/>
+              <a:buFont typeface="Wingdings 3" charset="2"/>
+              <a:buChar char=""/>
+              <a:defRPr sz="1800" b="0" i="0" kern="1200">
+                <a:solidFill>
+                  <a:schemeClr val="tx1"/>
+                </a:solidFill>
+                <a:latin typeface="+mj-lt"/>
+                <a:ea typeface="+mj-ea"/>
+                <a:cs typeface="+mj-cs"/>
+              </a:defRPr>
+            </a:lvl1pPr>
+            <a:lvl2pPr marL="742950" indent="-285750" algn="l" defTabSz="457200" rtl="0" eaLnBrk="1" latinLnBrk="0" hangingPunct="1">
+              <a:spcBef>
+                <a:spcPts val="1000"/>
+              </a:spcBef>
+              <a:spcAft>
+                <a:spcPts val="0"/>
+              </a:spcAft>
+              <a:buClr>
+                <a:schemeClr val="bg2">
+                  <a:lumMod val="40000"/>
+                  <a:lumOff val="60000"/>
+                </a:schemeClr>
+              </a:buClr>
+              <a:buSzPct val="80000"/>
+              <a:buFont typeface="Wingdings 3" charset="2"/>
+              <a:buChar char=""/>
+              <a:defRPr sz="1600" b="0" i="0" kern="1200">
+                <a:solidFill>
+                  <a:schemeClr val="tx1"/>
+                </a:solidFill>
+                <a:latin typeface="+mj-lt"/>
+                <a:ea typeface="+mj-ea"/>
+                <a:cs typeface="+mj-cs"/>
+              </a:defRPr>
+            </a:lvl2pPr>
+            <a:lvl3pPr marL="1143000" indent="-228600" algn="l" defTabSz="457200" rtl="0" eaLnBrk="1" latinLnBrk="0" hangingPunct="1">
+              <a:spcBef>
+                <a:spcPts val="1000"/>
+              </a:spcBef>
+              <a:spcAft>
+                <a:spcPts val="0"/>
+              </a:spcAft>
+              <a:buClr>
+                <a:schemeClr val="bg2">
+                  <a:lumMod val="40000"/>
+                  <a:lumOff val="60000"/>
+                </a:schemeClr>
+              </a:buClr>
+              <a:buSzPct val="80000"/>
+              <a:buFont typeface="Wingdings 3" charset="2"/>
+              <a:buChar char=""/>
+              <a:defRPr sz="1400" b="0" i="0" kern="1200">
+                <a:solidFill>
+                  <a:schemeClr val="tx1"/>
+                </a:solidFill>
+                <a:latin typeface="+mj-lt"/>
+                <a:ea typeface="+mj-ea"/>
+                <a:cs typeface="+mj-cs"/>
+              </a:defRPr>
+            </a:lvl3pPr>
+            <a:lvl4pPr marL="1600200" indent="-228600" algn="l" defTabSz="457200" rtl="0" eaLnBrk="1" latinLnBrk="0" hangingPunct="1">
+              <a:spcBef>
+                <a:spcPts val="1000"/>
+              </a:spcBef>
+              <a:spcAft>
+                <a:spcPts val="0"/>
+              </a:spcAft>
+              <a:buClr>
+                <a:schemeClr val="bg2">
+                  <a:lumMod val="40000"/>
+                  <a:lumOff val="60000"/>
+                </a:schemeClr>
+              </a:buClr>
+              <a:buSzPct val="80000"/>
+              <a:buFont typeface="Wingdings 3" charset="2"/>
+              <a:buChar char=""/>
+              <a:defRPr sz="1200" b="0" i="0" kern="1200">
+                <a:solidFill>
+                  <a:schemeClr val="tx1"/>
+                </a:solidFill>
+                <a:latin typeface="+mj-lt"/>
+                <a:ea typeface="+mj-ea"/>
+                <a:cs typeface="+mj-cs"/>
+              </a:defRPr>
+            </a:lvl4pPr>
+            <a:lvl5pPr marL="2057400" indent="-228600" algn="l" defTabSz="457200" rtl="0" eaLnBrk="1" latinLnBrk="0" hangingPunct="1">
+              <a:spcBef>
+                <a:spcPts val="1000"/>
+              </a:spcBef>
+              <a:spcAft>
+                <a:spcPts val="0"/>
+              </a:spcAft>
+              <a:buClr>
+                <a:schemeClr val="bg2">
+                  <a:lumMod val="40000"/>
+                  <a:lumOff val="60000"/>
+                </a:schemeClr>
+              </a:buClr>
+              <a:buSzPct val="80000"/>
+              <a:buFont typeface="Wingdings 3" charset="2"/>
+              <a:buChar char=""/>
+              <a:defRPr sz="1200" b="0" i="0" kern="1200">
+                <a:solidFill>
+                  <a:schemeClr val="tx1"/>
+                </a:solidFill>
+                <a:latin typeface="+mj-lt"/>
+                <a:ea typeface="+mj-ea"/>
+                <a:cs typeface="+mj-cs"/>
+              </a:defRPr>
+            </a:lvl5pPr>
+            <a:lvl6pPr marL="2506000" indent="-228600" algn="l" defTabSz="457200" rtl="0" eaLnBrk="1" latinLnBrk="0" hangingPunct="1">
+              <a:spcBef>
+                <a:spcPts val="1000"/>
+              </a:spcBef>
+              <a:spcAft>
+                <a:spcPts val="0"/>
+              </a:spcAft>
+              <a:buClr>
+                <a:schemeClr val="bg2">
+                  <a:lumMod val="40000"/>
+                  <a:lumOff val="60000"/>
+                </a:schemeClr>
+              </a:buClr>
+              <a:buSzPct val="80000"/>
+              <a:buFont typeface="Wingdings 3" charset="2"/>
+              <a:buChar char=""/>
+              <a:defRPr sz="1200" b="0" i="0" kern="1200">
+                <a:solidFill>
+                  <a:schemeClr val="tx1"/>
+                </a:solidFill>
+                <a:latin typeface="+mj-lt"/>
+                <a:ea typeface="+mj-ea"/>
+                <a:cs typeface="+mj-cs"/>
+              </a:defRPr>
+            </a:lvl6pPr>
+            <a:lvl7pPr marL="2971800" indent="-228600" algn="l" defTabSz="457200" rtl="0" eaLnBrk="1" latinLnBrk="0" hangingPunct="1">
+              <a:spcBef>
+                <a:spcPts val="1000"/>
+              </a:spcBef>
+              <a:spcAft>
+                <a:spcPts val="0"/>
+              </a:spcAft>
+              <a:buClr>
+                <a:schemeClr val="bg2">
+                  <a:lumMod val="40000"/>
+                  <a:lumOff val="60000"/>
+                </a:schemeClr>
+              </a:buClr>
+              <a:buSzPct val="80000"/>
+              <a:buFont typeface="Wingdings 3" charset="2"/>
+              <a:buChar char=""/>
+              <a:defRPr sz="1200" b="0" i="0" kern="1200">
+                <a:solidFill>
+                  <a:schemeClr val="tx1"/>
+                </a:solidFill>
+                <a:latin typeface="+mj-lt"/>
+                <a:ea typeface="+mj-ea"/>
+                <a:cs typeface="+mj-cs"/>
+              </a:defRPr>
+            </a:lvl7pPr>
+            <a:lvl8pPr marL="3429000" indent="-228600" algn="l" defTabSz="457200" rtl="0" eaLnBrk="1" latinLnBrk="0" hangingPunct="1">
+              <a:spcBef>
+                <a:spcPts val="1000"/>
+              </a:spcBef>
+              <a:spcAft>
+                <a:spcPts val="0"/>
+              </a:spcAft>
+              <a:buClr>
+                <a:schemeClr val="bg2">
+                  <a:lumMod val="40000"/>
+                  <a:lumOff val="60000"/>
+                </a:schemeClr>
+              </a:buClr>
+              <a:buSzPct val="80000"/>
+              <a:buFont typeface="Wingdings 3" charset="2"/>
+              <a:buChar char=""/>
+              <a:defRPr sz="1200" b="0" i="0" kern="1200">
+                <a:solidFill>
+                  <a:schemeClr val="tx1"/>
+                </a:solidFill>
+                <a:latin typeface="+mj-lt"/>
+                <a:ea typeface="+mj-ea"/>
+                <a:cs typeface="+mj-cs"/>
+              </a:defRPr>
+            </a:lvl8pPr>
+            <a:lvl9pPr marL="3886200" indent="-228600" algn="l" defTabSz="457200" rtl="0" eaLnBrk="1" latinLnBrk="0" hangingPunct="1">
+              <a:spcBef>
+                <a:spcPts val="1000"/>
+              </a:spcBef>
+              <a:spcAft>
+                <a:spcPts val="0"/>
+              </a:spcAft>
+              <a:buClr>
+                <a:schemeClr val="bg2">
+                  <a:lumMod val="40000"/>
+                  <a:lumOff val="60000"/>
+                </a:schemeClr>
+              </a:buClr>
+              <a:buSzPct val="80000"/>
+              <a:buFont typeface="Wingdings 3" charset="2"/>
+              <a:buChar char=""/>
+              <a:defRPr sz="1200" b="0" i="0" kern="1200">
+                <a:solidFill>
+                  <a:schemeClr val="tx1"/>
+                </a:solidFill>
+                <a:latin typeface="+mj-lt"/>
+                <a:ea typeface="+mj-ea"/>
+                <a:cs typeface="+mj-cs"/>
+              </a:defRPr>
+            </a:lvl9pPr>
+          </a:lstStyle>
+          <a:p>
+            <a:pPr marL="0" indent="0" algn="ctr">
+              <a:buFont typeface="Wingdings 3" charset="2"/>
+              <a:buNone/>
+            </a:pPr>
+            <a:r>
+              <a:rPr lang="en-US" sz="3000" dirty="0" err="1" smtClean="0">
+                <a:latin typeface="Agency FB" panose="020B0503020202020204" pitchFamily="34" charset="0"/>
+              </a:rPr>
+              <a:t>Kaloyan</a:t>
+            </a:r>
+            <a:r>
+              <a:rPr lang="en-US" sz="3000" dirty="0" smtClean="0">
+                <a:latin typeface="Agency FB" panose="020B0503020202020204" pitchFamily="34" charset="0"/>
+              </a:rPr>
+              <a:t> </a:t>
+            </a:r>
+            <a:r>
+              <a:rPr lang="en-US" sz="3000" dirty="0" err="1" smtClean="0">
+                <a:latin typeface="Agency FB" panose="020B0503020202020204" pitchFamily="34" charset="0"/>
+              </a:rPr>
+              <a:t>Botev</a:t>
+            </a:r>
+            <a:endParaRPr lang="en-US" sz="3000" dirty="0">
+              <a:latin typeface="Agency FB" panose="020B0503020202020204" pitchFamily="34" charset="0"/>
+            </a:endParaRPr>
+          </a:p>
+        </p:txBody>
+      </p:sp>
     </p:spTree>
     <p:extLst>
       <p:ext uri="{BB962C8B-B14F-4D97-AF65-F5344CB8AC3E}">

</xml_diff>